<commit_message>
Added new sample dashboard
</commit_message>
<xml_diff>
--- a/images/Sample dashboards/Sample_dashboards.pptx
+++ b/images/Sample dashboards/Sample_dashboards.pptx
@@ -104,6 +104,11 @@
       </a:defRPr>
     </a:lvl9pPr>
   </p:defaultTextStyle>
+  <p:extLst>
+    <p:ext uri="{EFAFB233-063F-42B5-8137-9DF3F51BA10A}">
+      <p15:sldGuideLst xmlns:p15="http://schemas.microsoft.com/office/powerpoint/2012/main"/>
+    </p:ext>
+  </p:extLst>
 </p:presentation>
 </file>
 
@@ -256,7 +261,7 @@
           <a:p>
             <a:fld id="{E3B75F80-F4B0-4C38-86B1-FEB191EA565F}" type="datetimeFigureOut">
               <a:rPr lang="es-MX" smtClean="0"/>
-              <a:t>21/09/2022</a:t>
+              <a:t>28/09/2022</a:t>
             </a:fld>
             <a:endParaRPr lang="es-MX"/>
           </a:p>
@@ -456,7 +461,7 @@
           <a:p>
             <a:fld id="{E3B75F80-F4B0-4C38-86B1-FEB191EA565F}" type="datetimeFigureOut">
               <a:rPr lang="es-MX" smtClean="0"/>
-              <a:t>21/09/2022</a:t>
+              <a:t>28/09/2022</a:t>
             </a:fld>
             <a:endParaRPr lang="es-MX"/>
           </a:p>
@@ -666,7 +671,7 @@
           <a:p>
             <a:fld id="{E3B75F80-F4B0-4C38-86B1-FEB191EA565F}" type="datetimeFigureOut">
               <a:rPr lang="es-MX" smtClean="0"/>
-              <a:t>21/09/2022</a:t>
+              <a:t>28/09/2022</a:t>
             </a:fld>
             <a:endParaRPr lang="es-MX"/>
           </a:p>
@@ -866,7 +871,7 @@
           <a:p>
             <a:fld id="{E3B75F80-F4B0-4C38-86B1-FEB191EA565F}" type="datetimeFigureOut">
               <a:rPr lang="es-MX" smtClean="0"/>
-              <a:t>21/09/2022</a:t>
+              <a:t>28/09/2022</a:t>
             </a:fld>
             <a:endParaRPr lang="es-MX"/>
           </a:p>
@@ -1142,7 +1147,7 @@
           <a:p>
             <a:fld id="{E3B75F80-F4B0-4C38-86B1-FEB191EA565F}" type="datetimeFigureOut">
               <a:rPr lang="es-MX" smtClean="0"/>
-              <a:t>21/09/2022</a:t>
+              <a:t>28/09/2022</a:t>
             </a:fld>
             <a:endParaRPr lang="es-MX"/>
           </a:p>
@@ -1410,7 +1415,7 @@
           <a:p>
             <a:fld id="{E3B75F80-F4B0-4C38-86B1-FEB191EA565F}" type="datetimeFigureOut">
               <a:rPr lang="es-MX" smtClean="0"/>
-              <a:t>21/09/2022</a:t>
+              <a:t>28/09/2022</a:t>
             </a:fld>
             <a:endParaRPr lang="es-MX"/>
           </a:p>
@@ -1825,7 +1830,7 @@
           <a:p>
             <a:fld id="{E3B75F80-F4B0-4C38-86B1-FEB191EA565F}" type="datetimeFigureOut">
               <a:rPr lang="es-MX" smtClean="0"/>
-              <a:t>21/09/2022</a:t>
+              <a:t>28/09/2022</a:t>
             </a:fld>
             <a:endParaRPr lang="es-MX"/>
           </a:p>
@@ -1967,7 +1972,7 @@
           <a:p>
             <a:fld id="{E3B75F80-F4B0-4C38-86B1-FEB191EA565F}" type="datetimeFigureOut">
               <a:rPr lang="es-MX" smtClean="0"/>
-              <a:t>21/09/2022</a:t>
+              <a:t>28/09/2022</a:t>
             </a:fld>
             <a:endParaRPr lang="es-MX"/>
           </a:p>
@@ -2080,7 +2085,7 @@
           <a:p>
             <a:fld id="{E3B75F80-F4B0-4C38-86B1-FEB191EA565F}" type="datetimeFigureOut">
               <a:rPr lang="es-MX" smtClean="0"/>
-              <a:t>21/09/2022</a:t>
+              <a:t>28/09/2022</a:t>
             </a:fld>
             <a:endParaRPr lang="es-MX"/>
           </a:p>
@@ -2393,7 +2398,7 @@
           <a:p>
             <a:fld id="{E3B75F80-F4B0-4C38-86B1-FEB191EA565F}" type="datetimeFigureOut">
               <a:rPr lang="es-MX" smtClean="0"/>
-              <a:t>21/09/2022</a:t>
+              <a:t>28/09/2022</a:t>
             </a:fld>
             <a:endParaRPr lang="es-MX"/>
           </a:p>
@@ -2682,7 +2687,7 @@
           <a:p>
             <a:fld id="{E3B75F80-F4B0-4C38-86B1-FEB191EA565F}" type="datetimeFigureOut">
               <a:rPr lang="es-MX" smtClean="0"/>
-              <a:t>21/09/2022</a:t>
+              <a:t>28/09/2022</a:t>
             </a:fld>
             <a:endParaRPr lang="es-MX"/>
           </a:p>
@@ -2925,7 +2930,7 @@
           <a:p>
             <a:fld id="{E3B75F80-F4B0-4C38-86B1-FEB191EA565F}" type="datetimeFigureOut">
               <a:rPr lang="es-MX" smtClean="0"/>
-              <a:t>21/09/2022</a:t>
+              <a:t>28/09/2022</a:t>
             </a:fld>
             <a:endParaRPr lang="es-MX"/>
           </a:p>
@@ -3344,10 +3349,10 @@
       </p:grpSpPr>
       <p:pic>
         <p:nvPicPr>
-          <p:cNvPr id="5" name="Picture 4" descr="Graphical user interface, chart&#10;&#10;Description automatically generated">
-            <a:extLst>
-              <a:ext uri="{FF2B5EF4-FFF2-40B4-BE49-F238E27FC236}">
-                <a16:creationId xmlns:a16="http://schemas.microsoft.com/office/drawing/2014/main" id="{108D16FF-6E26-DA32-6E91-D29B0C939B46}"/>
+          <p:cNvPr id="6" name="Picture 5" descr="Graphical user interface, application&#10;&#10;Description automatically generated">
+            <a:extLst>
+              <a:ext uri="{FF2B5EF4-FFF2-40B4-BE49-F238E27FC236}">
+                <a16:creationId xmlns:a16="http://schemas.microsoft.com/office/drawing/2014/main" id="{105DD5A2-C35C-4C8E-B9B7-6B26955995CC}"/>
               </a:ext>
             </a:extLst>
           </p:cNvPr>
@@ -3370,50 +3375,20 @@
         </p:blipFill>
         <p:spPr>
           <a:xfrm>
-            <a:off x="178124" y="3521376"/>
-            <a:ext cx="5652445" cy="3186973"/>
+            <a:off x="0" y="3459946"/>
+            <a:ext cx="5996824" cy="3398054"/>
           </a:xfrm>
           <a:prstGeom prst="rect">
             <a:avLst/>
           </a:prstGeom>
-          <a:solidFill>
-            <a:srgbClr val="FFFFFF">
-              <a:shade val="85000"/>
-            </a:srgbClr>
-          </a:solidFill>
-          <a:ln w="88900" cap="sq">
-            <a:solidFill>
-              <a:srgbClr val="FFFFFF"/>
-            </a:solidFill>
-            <a:miter lim="800000"/>
-          </a:ln>
-          <a:effectLst>
-            <a:outerShdw blurRad="55000" dist="18000" dir="5400000" algn="tl" rotWithShape="0">
-              <a:srgbClr val="000000">
-                <a:alpha val="40000"/>
-              </a:srgbClr>
-            </a:outerShdw>
-          </a:effectLst>
-          <a:scene3d>
-            <a:camera prst="orthographicFront"/>
-            <a:lightRig rig="twoPt" dir="t">
-              <a:rot lat="0" lon="0" rev="7200000"/>
-            </a:lightRig>
-          </a:scene3d>
-          <a:sp3d>
-            <a:bevelT w="25400" h="19050"/>
-            <a:contourClr>
-              <a:srgbClr val="FFFFFF"/>
-            </a:contourClr>
-          </a:sp3d>
         </p:spPr>
       </p:pic>
       <p:pic>
         <p:nvPicPr>
-          <p:cNvPr id="7" name="Picture 6" descr="Graphical user interface, chart, application&#10;&#10;Description automatically generated">
-            <a:extLst>
-              <a:ext uri="{FF2B5EF4-FFF2-40B4-BE49-F238E27FC236}">
-                <a16:creationId xmlns:a16="http://schemas.microsoft.com/office/drawing/2014/main" id="{61E2B915-9246-3726-AA79-B7D436B72460}"/>
+          <p:cNvPr id="10" name="Picture 9" descr="Graphical user interface, chart, application&#10;&#10;Description automatically generated">
+            <a:extLst>
+              <a:ext uri="{FF2B5EF4-FFF2-40B4-BE49-F238E27FC236}">
+                <a16:creationId xmlns:a16="http://schemas.microsoft.com/office/drawing/2014/main" id="{FCFC1030-711A-ED02-8FA7-C78AE75462A4}"/>
               </a:ext>
             </a:extLst>
           </p:cNvPr>
@@ -3436,50 +3411,20 @@
         </p:blipFill>
         <p:spPr>
           <a:xfrm>
-            <a:off x="178124" y="99593"/>
-            <a:ext cx="5727375" cy="3237031"/>
+            <a:off x="52531" y="0"/>
+            <a:ext cx="5944293" cy="3359630"/>
           </a:xfrm>
           <a:prstGeom prst="rect">
             <a:avLst/>
           </a:prstGeom>
-          <a:solidFill>
-            <a:srgbClr val="FFFFFF">
-              <a:shade val="85000"/>
-            </a:srgbClr>
-          </a:solidFill>
-          <a:ln w="88900" cap="sq">
-            <a:solidFill>
-              <a:srgbClr val="FFFFFF"/>
-            </a:solidFill>
-            <a:miter lim="800000"/>
-          </a:ln>
-          <a:effectLst>
-            <a:outerShdw blurRad="55000" dist="18000" dir="5400000" algn="tl" rotWithShape="0">
-              <a:srgbClr val="000000">
-                <a:alpha val="40000"/>
-              </a:srgbClr>
-            </a:outerShdw>
-          </a:effectLst>
-          <a:scene3d>
-            <a:camera prst="orthographicFront"/>
-            <a:lightRig rig="twoPt" dir="t">
-              <a:rot lat="0" lon="0" rev="7200000"/>
-            </a:lightRig>
-          </a:scene3d>
-          <a:sp3d>
-            <a:bevelT w="25400" h="19050"/>
-            <a:contourClr>
-              <a:srgbClr val="FFFFFF"/>
-            </a:contourClr>
-          </a:sp3d>
         </p:spPr>
       </p:pic>
       <p:pic>
         <p:nvPicPr>
-          <p:cNvPr id="9" name="Picture 8" descr="Chart, bar chart&#10;&#10;Description automatically generated">
-            <a:extLst>
-              <a:ext uri="{FF2B5EF4-FFF2-40B4-BE49-F238E27FC236}">
-                <a16:creationId xmlns:a16="http://schemas.microsoft.com/office/drawing/2014/main" id="{E755A63B-7200-4103-C9A0-0DCCC8793854}"/>
+          <p:cNvPr id="13" name="Picture 12" descr="Chart, bar chart&#10;&#10;Description automatically generated">
+            <a:extLst>
+              <a:ext uri="{FF2B5EF4-FFF2-40B4-BE49-F238E27FC236}">
+                <a16:creationId xmlns:a16="http://schemas.microsoft.com/office/drawing/2014/main" id="{07C4F2BC-DD84-A959-6BA7-4696835C841B}"/>
               </a:ext>
             </a:extLst>
           </p:cNvPr>
@@ -3502,50 +3447,20 @@
         </p:blipFill>
         <p:spPr>
           <a:xfrm>
-            <a:off x="6130268" y="99593"/>
-            <a:ext cx="5883608" cy="3237031"/>
+            <a:off x="6127372" y="0"/>
+            <a:ext cx="6064628" cy="3336624"/>
           </a:xfrm>
           <a:prstGeom prst="rect">
             <a:avLst/>
           </a:prstGeom>
-          <a:solidFill>
-            <a:srgbClr val="FFFFFF">
-              <a:shade val="85000"/>
-            </a:srgbClr>
-          </a:solidFill>
-          <a:ln w="88900" cap="sq">
-            <a:solidFill>
-              <a:srgbClr val="FFFFFF"/>
-            </a:solidFill>
-            <a:miter lim="800000"/>
-          </a:ln>
-          <a:effectLst>
-            <a:outerShdw blurRad="55000" dist="18000" dir="5400000" algn="tl" rotWithShape="0">
-              <a:srgbClr val="000000">
-                <a:alpha val="40000"/>
-              </a:srgbClr>
-            </a:outerShdw>
-          </a:effectLst>
-          <a:scene3d>
-            <a:camera prst="orthographicFront"/>
-            <a:lightRig rig="twoPt" dir="t">
-              <a:rot lat="0" lon="0" rev="7200000"/>
-            </a:lightRig>
-          </a:scene3d>
-          <a:sp3d>
-            <a:bevelT w="25400" h="19050"/>
-            <a:contourClr>
-              <a:srgbClr val="FFFFFF"/>
-            </a:contourClr>
-          </a:sp3d>
         </p:spPr>
       </p:pic>
       <p:pic>
         <p:nvPicPr>
-          <p:cNvPr id="11" name="Picture 10" descr="Graphical user interface, application&#10;&#10;Description automatically generated">
-            <a:extLst>
-              <a:ext uri="{FF2B5EF4-FFF2-40B4-BE49-F238E27FC236}">
-                <a16:creationId xmlns:a16="http://schemas.microsoft.com/office/drawing/2014/main" id="{B2DCD265-6B7C-E4B4-3D34-A6D09E520CD4}"/>
+          <p:cNvPr id="15" name="Picture 14" descr="Graphical user interface, application&#10;&#10;Description automatically generated">
+            <a:extLst>
+              <a:ext uri="{FF2B5EF4-FFF2-40B4-BE49-F238E27FC236}">
+                <a16:creationId xmlns:a16="http://schemas.microsoft.com/office/drawing/2014/main" id="{DFF48C93-24F4-E131-EC63-33BB6BC37F79}"/>
               </a:ext>
             </a:extLst>
           </p:cNvPr>
@@ -3568,42 +3483,12 @@
         </p:blipFill>
         <p:spPr>
           <a:xfrm>
-            <a:off x="6195176" y="3521376"/>
-            <a:ext cx="5753791" cy="3237031"/>
+            <a:off x="6195177" y="3484240"/>
+            <a:ext cx="5996824" cy="3373760"/>
           </a:xfrm>
           <a:prstGeom prst="rect">
             <a:avLst/>
           </a:prstGeom>
-          <a:solidFill>
-            <a:srgbClr val="FFFFFF">
-              <a:shade val="85000"/>
-            </a:srgbClr>
-          </a:solidFill>
-          <a:ln w="88900" cap="sq">
-            <a:solidFill>
-              <a:srgbClr val="FFFFFF"/>
-            </a:solidFill>
-            <a:miter lim="800000"/>
-          </a:ln>
-          <a:effectLst>
-            <a:outerShdw blurRad="55000" dist="18000" dir="5400000" algn="tl" rotWithShape="0">
-              <a:srgbClr val="000000">
-                <a:alpha val="40000"/>
-              </a:srgbClr>
-            </a:outerShdw>
-          </a:effectLst>
-          <a:scene3d>
-            <a:camera prst="orthographicFront"/>
-            <a:lightRig rig="twoPt" dir="t">
-              <a:rot lat="0" lon="0" rev="7200000"/>
-            </a:lightRig>
-          </a:scene3d>
-          <a:sp3d>
-            <a:bevelT w="25400" h="19050"/>
-            <a:contourClr>
-              <a:srgbClr val="FFFFFF"/>
-            </a:contourClr>
-          </a:sp3d>
         </p:spPr>
       </p:pic>
     </p:spTree>

</xml_diff>